<commit_message>
update queries and chart
</commit_message>
<xml_diff>
--- a/SQL Project.pptx
+++ b/SQL Project.pptx
@@ -247,7 +247,7 @@
           <a:lstStyle/>
           <a:p>
             <a:pPr>
-              <a:defRPr sz="1862" b="0" i="0" u="none" strike="noStrike" kern="1200" spc="0" baseline="0">
+              <a:defRPr sz="1400" b="0" i="0" u="none" strike="noStrike" kern="1200" spc="0" baseline="0">
                 <a:solidFill>
                   <a:schemeClr val="tx1">
                     <a:lumMod val="65000"/>
@@ -260,9 +260,12 @@
               </a:defRPr>
             </a:pPr>
             <a:r>
-              <a:rPr lang="en-US"/>
-              <a:t>Total order volume from each country</a:t>
-            </a:r>
+              <a:rPr lang="en-US" sz="1400" b="0" i="0" u="none" strike="noStrike" baseline="0" dirty="0" smtClean="0">
+                <a:effectLst/>
+              </a:rPr>
+              <a:t>Total Order Volume from each country </a:t>
+            </a:r>
+            <a:endParaRPr lang="en-US" dirty="0"/>
           </a:p>
         </c:rich>
       </c:tx>
@@ -280,7 +283,7 @@
         <a:lstStyle/>
         <a:p>
           <a:pPr>
-            <a:defRPr sz="1862" b="0" i="0" u="none" strike="noStrike" kern="1200" spc="0" baseline="0">
+            <a:defRPr sz="1400" b="0" i="0" u="none" strike="noStrike" kern="1200" spc="0" baseline="0">
               <a:solidFill>
                 <a:schemeClr val="tx1">
                   <a:lumMod val="65000"/>
@@ -298,7 +301,17 @@
     </c:title>
     <c:autoTitleDeleted val="0"/>
     <c:plotArea>
-      <c:layout/>
+      <c:layout>
+        <c:manualLayout>
+          <c:layoutTarget val="inner"/>
+          <c:xMode val="edge"/>
+          <c:yMode val="edge"/>
+          <c:x val="0.15068110236220472"/>
+          <c:y val="0.1423862310768709"/>
+          <c:w val="0.76457589676290461"/>
+          <c:h val="0.70737750516518716"/>
+        </c:manualLayout>
+      </c:layout>
       <c:barChart>
         <c:barDir val="bar"/>
         <c:grouping val="clustered"/>
@@ -308,11 +321,11 @@
           <c:order val="0"/>
           <c:tx>
             <c:strRef>
-              <c:f>'Total Order Volume from each co'!$C$1</c:f>
+              <c:f>'Total Order Volume from each co'!$B$1</c:f>
               <c:strCache>
                 <c:ptCount val="1"/>
                 <c:pt idx="0">
-                  <c:v>TotalSales</c:v>
+                  <c:v>Total Sales</c:v>
                 </c:pt>
               </c:strCache>
             </c:strRef>
@@ -328,50 +341,31 @@
           </c:spPr>
           <c:invertIfNegative val="0"/>
           <c:cat>
-            <c:multiLvlStrRef>
-              <c:f>'Total Order Volume from each co'!$A$2:$B$6</c:f>
-              <c:multiLvlStrCache>
+            <c:strRef>
+              <c:f>'Total Order Volume from each co'!$A$2:$A$6</c:f>
+              <c:strCache>
                 <c:ptCount val="5"/>
-                <c:lvl>
-                  <c:pt idx="0">
-                    <c:v>USA</c:v>
-                  </c:pt>
-                  <c:pt idx="1">
-                    <c:v>Canada</c:v>
-                  </c:pt>
-                  <c:pt idx="2">
-                    <c:v>France</c:v>
-                  </c:pt>
-                  <c:pt idx="3">
-                    <c:v>Brazil</c:v>
-                  </c:pt>
-                  <c:pt idx="4">
-                    <c:v>Germany</c:v>
-                  </c:pt>
-                </c:lvl>
-                <c:lvl>
-                  <c:pt idx="0">
-                    <c:v>91</c:v>
-                  </c:pt>
-                  <c:pt idx="1">
-                    <c:v>56</c:v>
-                  </c:pt>
-                  <c:pt idx="2">
-                    <c:v>35</c:v>
-                  </c:pt>
-                  <c:pt idx="3">
-                    <c:v>35</c:v>
-                  </c:pt>
-                  <c:pt idx="4">
-                    <c:v>28</c:v>
-                  </c:pt>
-                </c:lvl>
-              </c:multiLvlStrCache>
-            </c:multiLvlStrRef>
+                <c:pt idx="0">
+                  <c:v>USA</c:v>
+                </c:pt>
+                <c:pt idx="1">
+                  <c:v>Canada</c:v>
+                </c:pt>
+                <c:pt idx="2">
+                  <c:v>France</c:v>
+                </c:pt>
+                <c:pt idx="3">
+                  <c:v>Brazil</c:v>
+                </c:pt>
+                <c:pt idx="4">
+                  <c:v>Germany</c:v>
+                </c:pt>
+              </c:strCache>
+            </c:strRef>
           </c:cat>
           <c:val>
             <c:numRef>
-              <c:f>'Total Order Volume from each co'!$C$2:$C$6</c:f>
+              <c:f>'Total Order Volume from each co'!$B$2:$B$6</c:f>
               <c:numCache>
                 <c:formatCode>General</c:formatCode>
                 <c:ptCount val="5"/>
@@ -403,11 +397,11 @@
           <c:showBubbleSize val="0"/>
         </c:dLbls>
         <c:gapWidth val="182"/>
-        <c:axId val="-446294368"/>
-        <c:axId val="-446293280"/>
+        <c:axId val="-1949181456"/>
+        <c:axId val="-1949184720"/>
       </c:barChart>
       <c:catAx>
-        <c:axId val="-446294368"/>
+        <c:axId val="-1949181456"/>
         <c:scaling>
           <c:orientation val="minMax"/>
         </c:scaling>
@@ -435,7 +429,7 @@
           <a:lstStyle/>
           <a:p>
             <a:pPr>
-              <a:defRPr sz="1197" b="0" i="0" u="none" strike="noStrike" kern="1200" baseline="0">
+              <a:defRPr sz="900" b="0" i="0" u="none" strike="noStrike" kern="1200" baseline="0">
                 <a:solidFill>
                   <a:schemeClr val="tx1">
                     <a:lumMod val="65000"/>
@@ -450,7 +444,7 @@
             <a:endParaRPr lang="en-US"/>
           </a:p>
         </c:txPr>
-        <c:crossAx val="-446293280"/>
+        <c:crossAx val="-1949184720"/>
         <c:crosses val="autoZero"/>
         <c:auto val="1"/>
         <c:lblAlgn val="ctr"/>
@@ -458,7 +452,7 @@
         <c:noMultiLvlLbl val="0"/>
       </c:catAx>
       <c:valAx>
-        <c:axId val="-446293280"/>
+        <c:axId val="-1949184720"/>
         <c:scaling>
           <c:orientation val="minMax"/>
         </c:scaling>
@@ -494,7 +488,7 @@
           <a:lstStyle/>
           <a:p>
             <a:pPr>
-              <a:defRPr sz="1197" b="0" i="0" u="none" strike="noStrike" kern="1200" baseline="0">
+              <a:defRPr sz="900" b="0" i="0" u="none" strike="noStrike" kern="1200" baseline="0">
                 <a:solidFill>
                   <a:schemeClr val="tx1">
                     <a:lumMod val="65000"/>
@@ -509,7 +503,7 @@
             <a:endParaRPr lang="en-US"/>
           </a:p>
         </c:txPr>
-        <c:crossAx val="-446294368"/>
+        <c:crossAx val="-1949181456"/>
         <c:crosses val="autoZero"/>
         <c:crossBetween val="between"/>
       </c:valAx>
@@ -591,7 +585,6 @@
           </a:p>
         </c:rich>
       </c:tx>
-      <c:layout/>
       <c:overlay val="0"/>
       <c:spPr>
         <a:noFill/>
@@ -1622,12 +1615,12 @@
         </c:dLbls>
         <c:gapWidth val="150"/>
         <c:shape val="box"/>
-        <c:axId val="-446290560"/>
-        <c:axId val="-446290016"/>
+        <c:axId val="-2039049536"/>
+        <c:axId val="-2039048448"/>
         <c:axId val="0"/>
       </c:bar3DChart>
       <c:catAx>
-        <c:axId val="-446290560"/>
+        <c:axId val="-2039049536"/>
         <c:scaling>
           <c:orientation val="minMax"/>
         </c:scaling>
@@ -1664,7 +1657,7 @@
             <a:endParaRPr lang="en-US"/>
           </a:p>
         </c:txPr>
-        <c:crossAx val="-446290016"/>
+        <c:crossAx val="-2039048448"/>
         <c:crosses val="autoZero"/>
         <c:auto val="1"/>
         <c:lblAlgn val="ctr"/>
@@ -1672,7 +1665,7 @@
         <c:noMultiLvlLbl val="0"/>
       </c:catAx>
       <c:valAx>
-        <c:axId val="-446290016"/>
+        <c:axId val="-2039048448"/>
         <c:scaling>
           <c:orientation val="minMax"/>
         </c:scaling>
@@ -1723,7 +1716,7 @@
             <a:endParaRPr lang="en-US"/>
           </a:p>
         </c:txPr>
-        <c:crossAx val="-446290560"/>
+        <c:crossAx val="-2039049536"/>
         <c:crosses val="autoZero"/>
         <c:crossBetween val="between"/>
       </c:valAx>
@@ -1737,7 +1730,6 @@
     </c:plotArea>
     <c:legend>
       <c:legendPos val="b"/>
-      <c:layout/>
       <c:overlay val="0"/>
       <c:spPr>
         <a:noFill/>
@@ -1837,7 +1829,6 @@
           </a:p>
         </c:rich>
       </c:tx>
-      <c:layout/>
       <c:overlay val="0"/>
       <c:spPr>
         <a:noFill/>
@@ -1869,7 +1860,17 @@
     </c:title>
     <c:autoTitleDeleted val="0"/>
     <c:plotArea>
-      <c:layout/>
+      <c:layout>
+        <c:manualLayout>
+          <c:layoutTarget val="inner"/>
+          <c:xMode val="edge"/>
+          <c:yMode val="edge"/>
+          <c:x val="0.12291688538932634"/>
+          <c:y val="0.16574562259975265"/>
+          <c:w val="0.80208311461067372"/>
+          <c:h val="0.49716266354227689"/>
+        </c:manualLayout>
+      </c:layout>
       <c:barChart>
         <c:barDir val="col"/>
         <c:grouping val="clustered"/>
@@ -2088,11 +2089,11 @@
         </c:dLbls>
         <c:gapWidth val="219"/>
         <c:overlap val="-27"/>
-        <c:axId val="-446099088"/>
-        <c:axId val="-446094736"/>
+        <c:axId val="-2039047904"/>
+        <c:axId val="-2039046816"/>
       </c:barChart>
       <c:catAx>
-        <c:axId val="-446099088"/>
+        <c:axId val="-2039047904"/>
         <c:scaling>
           <c:orientation val="minMax"/>
         </c:scaling>
@@ -2135,7 +2136,7 @@
             <a:endParaRPr lang="en-US"/>
           </a:p>
         </c:txPr>
-        <c:crossAx val="-446094736"/>
+        <c:crossAx val="-2039046816"/>
         <c:crosses val="autoZero"/>
         <c:auto val="1"/>
         <c:lblAlgn val="ctr"/>
@@ -2143,7 +2144,7 @@
         <c:noMultiLvlLbl val="0"/>
       </c:catAx>
       <c:valAx>
-        <c:axId val="-446094736"/>
+        <c:axId val="-2039046816"/>
         <c:scaling>
           <c:orientation val="minMax"/>
         </c:scaling>
@@ -2194,7 +2195,7 @@
             <a:endParaRPr lang="en-US"/>
           </a:p>
         </c:txPr>
-        <c:crossAx val="-446099088"/>
+        <c:crossAx val="-2039047904"/>
         <c:crosses val="autoZero"/>
         <c:crossBetween val="between"/>
       </c:valAx>
@@ -2208,7 +2209,6 @@
     </c:plotArea>
     <c:legend>
       <c:legendPos val="b"/>
-      <c:layout/>
       <c:overlay val="0"/>
       <c:spPr>
         <a:noFill/>
@@ -2308,7 +2308,6 @@
           </a:p>
         </c:rich>
       </c:tx>
-      <c:layout/>
       <c:overlay val="0"/>
       <c:spPr>
         <a:noFill/>
@@ -2793,12 +2792,12 @@
         </c:dLbls>
         <c:gapWidth val="150"/>
         <c:shape val="box"/>
-        <c:axId val="-446090384"/>
-        <c:axId val="-446087664"/>
+        <c:axId val="-12561504"/>
+        <c:axId val="-2035707600"/>
         <c:axId val="0"/>
       </c:bar3DChart>
       <c:catAx>
-        <c:axId val="-446090384"/>
+        <c:axId val="-12561504"/>
         <c:scaling>
           <c:orientation val="minMax"/>
         </c:scaling>
@@ -2835,7 +2834,7 @@
             <a:endParaRPr lang="en-US"/>
           </a:p>
         </c:txPr>
-        <c:crossAx val="-446087664"/>
+        <c:crossAx val="-2035707600"/>
         <c:crosses val="autoZero"/>
         <c:auto val="1"/>
         <c:lblAlgn val="ctr"/>
@@ -2843,7 +2842,7 @@
         <c:noMultiLvlLbl val="0"/>
       </c:catAx>
       <c:valAx>
-        <c:axId val="-446087664"/>
+        <c:axId val="-2035707600"/>
         <c:scaling>
           <c:orientation val="minMax"/>
         </c:scaling>
@@ -2894,7 +2893,7 @@
             <a:endParaRPr lang="en-US"/>
           </a:p>
         </c:txPr>
-        <c:crossAx val="-446090384"/>
+        <c:crossAx val="-12561504"/>
         <c:crosses val="autoZero"/>
         <c:crossBetween val="between"/>
       </c:valAx>
@@ -2908,7 +2907,6 @@
     </c:plotArea>
     <c:legend>
       <c:legendPos val="b"/>
-      <c:layout/>
       <c:overlay val="0"/>
       <c:spPr>
         <a:noFill/>
@@ -3134,7 +3132,7 @@
         <a:lumOff val="35000"/>
       </a:schemeClr>
     </cs:fontRef>
-    <cs:defRPr sz="1330" kern="1200"/>
+    <cs:defRPr sz="1000" kern="1200"/>
   </cs:axisTitle>
   <cs:categoryAxis>
     <cs:lnRef idx="0"/>
@@ -3157,7 +3155,7 @@
         <a:round/>
       </a:ln>
     </cs:spPr>
-    <cs:defRPr sz="1197" kern="1200"/>
+    <cs:defRPr sz="900" kern="1200"/>
   </cs:categoryAxis>
   <cs:chartArea mods="allowNoFillOverride allowNoLineOverride">
     <cs:lnRef idx="0"/>
@@ -3180,7 +3178,7 @@
         <a:round/>
       </a:ln>
     </cs:spPr>
-    <cs:defRPr sz="1330" kern="1200"/>
+    <cs:defRPr sz="1000" kern="1200"/>
   </cs:chartArea>
   <cs:dataLabel>
     <cs:lnRef idx="0"/>
@@ -3192,7 +3190,7 @@
         <a:lumOff val="25000"/>
       </a:schemeClr>
     </cs:fontRef>
-    <cs:defRPr sz="1197" kern="1200"/>
+    <cs:defRPr sz="900" kern="1200"/>
   </cs:dataLabel>
   <cs:dataLabelCallout>
     <cs:lnRef idx="0"/>
@@ -3217,7 +3215,7 @@
         </a:solidFill>
       </a:ln>
     </cs:spPr>
-    <cs:defRPr sz="1197" kern="1200"/>
+    <cs:defRPr sz="900" kern="1200"/>
     <cs:bodyPr rot="0" spcFirstLastPara="1" vertOverflow="clip" horzOverflow="clip" vert="horz" wrap="square" lIns="36576" tIns="18288" rIns="36576" bIns="18288" anchor="ctr" anchorCtr="1">
       <a:spAutoFit/>
     </cs:bodyPr>
@@ -3320,7 +3318,7 @@
         <a:round/>
       </a:ln>
     </cs:spPr>
-    <cs:defRPr sz="1197" kern="1200"/>
+    <cs:defRPr sz="900" kern="1200"/>
   </cs:dataTable>
   <cs:downBar>
     <cs:lnRef idx="0"/>
@@ -3485,7 +3483,7 @@
         <a:lumOff val="35000"/>
       </a:schemeClr>
     </cs:fontRef>
-    <cs:defRPr sz="1197" kern="1200"/>
+    <cs:defRPr sz="900" kern="1200"/>
   </cs:legend>
   <cs:plotArea mods="allowNoFillOverride allowNoLineOverride">
     <cs:lnRef idx="0"/>
@@ -3513,7 +3511,7 @@
         <a:lumOff val="35000"/>
       </a:schemeClr>
     </cs:fontRef>
-    <cs:defRPr sz="1197" kern="1200"/>
+    <cs:defRPr sz="900" kern="1200"/>
   </cs:seriesAxis>
   <cs:seriesLine>
     <cs:lnRef idx="0"/>
@@ -3544,7 +3542,7 @@
         <a:lumOff val="35000"/>
       </a:schemeClr>
     </cs:fontRef>
-    <cs:defRPr sz="1862" b="0" kern="1200" spc="0" baseline="0"/>
+    <cs:defRPr sz="1400" b="0" kern="1200" spc="0" baseline="0"/>
   </cs:title>
   <cs:trendline>
     <cs:lnRef idx="0">
@@ -3574,7 +3572,7 @@
         <a:lumOff val="35000"/>
       </a:schemeClr>
     </cs:fontRef>
-    <cs:defRPr sz="1197" kern="1200"/>
+    <cs:defRPr sz="900" kern="1200"/>
   </cs:trendlineLabel>
   <cs:upBar>
     <cs:lnRef idx="0"/>
@@ -3608,7 +3606,7 @@
         <a:lumOff val="35000"/>
       </a:schemeClr>
     </cs:fontRef>
-    <cs:defRPr sz="1197" kern="1200"/>
+    <cs:defRPr sz="900" kern="1200"/>
   </cs:valueAxis>
   <cs:wall>
     <cs:lnRef idx="0"/>
@@ -5611,7 +5609,7 @@
             </a:pPr>
             <a:r>
               <a:rPr lang="en-US" dirty="0" smtClean="0"/>
-              <a:t>  COUNT(</a:t>
+              <a:t>  </a:t>
             </a:r>
             <a:r>
               <a:rPr lang="en-US" dirty="0" err="1" smtClean="0"/>
@@ -5619,7 +5617,7 @@
             </a:r>
             <a:r>
               <a:rPr lang="en-US" dirty="0" smtClean="0"/>
-              <a:t>) AS Purchase,</a:t>
+              <a:t> AS Country,</a:t>
             </a:r>
           </a:p>
           <a:p>
@@ -5631,15 +5629,51 @@
             </a:pPr>
             <a:r>
               <a:rPr lang="en-US" dirty="0" smtClean="0"/>
-              <a:t>  </a:t>
+              <a:t>  Total(</a:t>
             </a:r>
             <a:r>
               <a:rPr lang="en-US" dirty="0" err="1" smtClean="0"/>
-              <a:t>Customer.Country</a:t>
+              <a:t>Invoice.Total</a:t>
             </a:r>
             <a:r>
               <a:rPr lang="en-US" dirty="0" smtClean="0"/>
-              <a:t> AS </a:t>
+              <a:t>) AS "Total Sales"</a:t>
+            </a:r>
+          </a:p>
+          <a:p>
+            <a:pPr lvl="0" rtl="0">
+              <a:spcBef>
+                <a:spcPts val="0"/>
+              </a:spcBef>
+              <a:buNone/>
+            </a:pPr>
+            <a:r>
+              <a:rPr lang="en-US" dirty="0" smtClean="0"/>
+              <a:t>FROM Invoice</a:t>
+            </a:r>
+          </a:p>
+          <a:p>
+            <a:pPr lvl="0" rtl="0">
+              <a:spcBef>
+                <a:spcPts val="0"/>
+              </a:spcBef>
+              <a:buNone/>
+            </a:pPr>
+            <a:r>
+              <a:rPr lang="en-US" dirty="0" smtClean="0"/>
+              <a:t>INNER JOIN Customer</a:t>
+            </a:r>
+          </a:p>
+          <a:p>
+            <a:pPr lvl="0" rtl="0">
+              <a:spcBef>
+                <a:spcPts val="0"/>
+              </a:spcBef>
+              <a:buNone/>
+            </a:pPr>
+            <a:r>
+              <a:rPr lang="en-US" dirty="0" smtClean="0"/>
+              <a:t>  ON (</a:t>
             </a:r>
             <a:r>
               <a:rPr lang="en-US" dirty="0" err="1" smtClean="0"/>
@@ -5647,7 +5681,23 @@
             </a:r>
             <a:r>
               <a:rPr lang="en-US" dirty="0" smtClean="0"/>
-              <a:t>,</a:t>
+              <a:t> IS NOT NULL AND </a:t>
+            </a:r>
+            <a:r>
+              <a:rPr lang="en-US" dirty="0" err="1" smtClean="0"/>
+              <a:t>Customer.CustomerId</a:t>
+            </a:r>
+            <a:r>
+              <a:rPr lang="en-US" dirty="0" smtClean="0"/>
+              <a:t> = </a:t>
+            </a:r>
+            <a:r>
+              <a:rPr lang="en-US" dirty="0" err="1" smtClean="0"/>
+              <a:t>Invoice.CustomerId</a:t>
+            </a:r>
+            <a:r>
+              <a:rPr lang="en-US" dirty="0" smtClean="0"/>
+              <a:t>)</a:t>
             </a:r>
           </a:p>
           <a:p>
@@ -5659,21 +5709,8 @@
             </a:pPr>
             <a:r>
               <a:rPr lang="en-US" dirty="0" smtClean="0"/>
-              <a:t>  Total(</a:t>
-            </a:r>
-            <a:r>
-              <a:rPr lang="en-US" dirty="0" err="1" smtClean="0"/>
-              <a:t>Invoice.Total</a:t>
-            </a:r>
-            <a:r>
-              <a:rPr lang="en-US" dirty="0" smtClean="0"/>
-              <a:t>) AS </a:t>
-            </a:r>
-            <a:r>
-              <a:rPr lang="en-US" dirty="0" err="1" smtClean="0"/>
-              <a:t>TotalSales</a:t>
-            </a:r>
-            <a:endParaRPr lang="en-US" dirty="0" smtClean="0"/>
+              <a:t>GROUP BY Country</a:t>
+            </a:r>
           </a:p>
           <a:p>
             <a:pPr lvl="0" rtl="0">
@@ -5684,7 +5721,7 @@
             </a:pPr>
             <a:r>
               <a:rPr lang="en-US" dirty="0" smtClean="0"/>
-              <a:t>FROM Invoice</a:t>
+              <a:t>ORDER BY "Total Sales" DESC</a:t>
             </a:r>
           </a:p>
           <a:p>
@@ -5696,93 +5733,9 @@
             </a:pPr>
             <a:r>
               <a:rPr lang="en-US" dirty="0" smtClean="0"/>
-              <a:t>INNER JOIN Customer</a:t>
-            </a:r>
-          </a:p>
-          <a:p>
-            <a:pPr lvl="0" rtl="0">
-              <a:spcBef>
-                <a:spcPts val="0"/>
-              </a:spcBef>
-              <a:buNone/>
-            </a:pPr>
-            <a:r>
-              <a:rPr lang="en-US" dirty="0" smtClean="0"/>
-              <a:t>  ON (</a:t>
-            </a:r>
-            <a:r>
-              <a:rPr lang="en-US" dirty="0" err="1" smtClean="0"/>
-              <a:t>BillingCountry</a:t>
-            </a:r>
-            <a:r>
-              <a:rPr lang="en-US" dirty="0" smtClean="0"/>
-              <a:t> IS NOT NULL AND </a:t>
-            </a:r>
-            <a:r>
-              <a:rPr lang="en-US" dirty="0" err="1" smtClean="0"/>
-              <a:t>Customer.CustomerId</a:t>
-            </a:r>
-            <a:r>
-              <a:rPr lang="en-US" dirty="0" smtClean="0"/>
-              <a:t> = </a:t>
-            </a:r>
-            <a:r>
-              <a:rPr lang="en-US" dirty="0" err="1" smtClean="0"/>
-              <a:t>Invoice.CustomerId</a:t>
-            </a:r>
-            <a:r>
-              <a:rPr lang="en-US" dirty="0" smtClean="0"/>
-              <a:t>)</a:t>
-            </a:r>
-          </a:p>
-          <a:p>
-            <a:pPr lvl="0" rtl="0">
-              <a:spcBef>
-                <a:spcPts val="0"/>
-              </a:spcBef>
-              <a:buNone/>
-            </a:pPr>
-            <a:r>
-              <a:rPr lang="en-US" dirty="0" smtClean="0"/>
-              <a:t>GROUP BY </a:t>
-            </a:r>
-            <a:r>
-              <a:rPr lang="en-US" dirty="0" err="1" smtClean="0"/>
-              <a:t>Customer.Country</a:t>
+              <a:t>LIMIT 5;</a:t>
             </a:r>
             <a:endParaRPr lang="en-US" dirty="0" smtClean="0"/>
-          </a:p>
-          <a:p>
-            <a:pPr lvl="0" rtl="0">
-              <a:spcBef>
-                <a:spcPts val="0"/>
-              </a:spcBef>
-              <a:buNone/>
-            </a:pPr>
-            <a:r>
-              <a:rPr lang="en-US" dirty="0" smtClean="0"/>
-              <a:t>ORDER BY </a:t>
-            </a:r>
-            <a:r>
-              <a:rPr lang="en-US" dirty="0" err="1" smtClean="0"/>
-              <a:t>TotalSales</a:t>
-            </a:r>
-            <a:r>
-              <a:rPr lang="en-US" dirty="0" smtClean="0"/>
-              <a:t> DESC</a:t>
-            </a:r>
-          </a:p>
-          <a:p>
-            <a:pPr lvl="0" rtl="0">
-              <a:spcBef>
-                <a:spcPts val="0"/>
-              </a:spcBef>
-              <a:buNone/>
-            </a:pPr>
-            <a:r>
-              <a:rPr lang="en-US" dirty="0" smtClean="0"/>
-              <a:t>LIMIT 5;</a:t>
-            </a:r>
           </a:p>
         </p:txBody>
       </p:sp>
@@ -10626,30 +10579,6 @@
           </a:p>
         </p:txBody>
       </p:sp>
-      <p:graphicFrame>
-        <p:nvGraphicFramePr>
-          <p:cNvPr id="8" name="Chart 7"/>
-          <p:cNvGraphicFramePr>
-            <a:graphicFrameLocks/>
-          </p:cNvGraphicFramePr>
-          <p:nvPr>
-            <p:extLst>
-              <p:ext uri="{D42A27DB-BD31-4B8C-83A1-F6EECF244321}">
-                <p14:modId xmlns:p14="http://schemas.microsoft.com/office/powerpoint/2010/main" val="3702893410"/>
-              </p:ext>
-            </p:extLst>
-          </p:nvPr>
-        </p:nvGraphicFramePr>
-        <p:xfrm>
-          <a:off x="382875" y="1418450"/>
-          <a:ext cx="4572000" cy="3043250"/>
-        </p:xfrm>
-        <a:graphic>
-          <a:graphicData uri="http://schemas.openxmlformats.org/drawingml/2006/chart">
-            <c:chart xmlns:c="http://schemas.openxmlformats.org/drawingml/2006/chart" xmlns:r="http://schemas.openxmlformats.org/officeDocument/2006/relationships" r:id="rId3"/>
-          </a:graphicData>
-        </a:graphic>
-      </p:graphicFrame>
       <p:sp>
         <p:nvSpPr>
           <p:cNvPr id="3" name="Rectangle 2"/>
@@ -10707,6 +10636,88 @@
               <a:rPr lang="en-US" dirty="0"/>
             </a:br>
             <a:endParaRPr lang="en-US" dirty="0"/>
+          </a:p>
+        </p:txBody>
+      </p:sp>
+      <p:graphicFrame>
+        <p:nvGraphicFramePr>
+          <p:cNvPr id="8" name="Chart 7"/>
+          <p:cNvGraphicFramePr>
+            <a:graphicFrameLocks/>
+          </p:cNvGraphicFramePr>
+          <p:nvPr>
+            <p:extLst>
+              <p:ext uri="{D42A27DB-BD31-4B8C-83A1-F6EECF244321}">
+                <p14:modId xmlns:p14="http://schemas.microsoft.com/office/powerpoint/2010/main" val="3656702822"/>
+              </p:ext>
+            </p:extLst>
+          </p:nvPr>
+        </p:nvGraphicFramePr>
+        <p:xfrm>
+          <a:off x="372225" y="1433992"/>
+          <a:ext cx="4572000" cy="3041516"/>
+        </p:xfrm>
+        <a:graphic>
+          <a:graphicData uri="http://schemas.openxmlformats.org/drawingml/2006/chart">
+            <c:chart xmlns:c="http://schemas.openxmlformats.org/drawingml/2006/chart" xmlns:r="http://schemas.openxmlformats.org/officeDocument/2006/relationships" r:id="rId3"/>
+          </a:graphicData>
+        </a:graphic>
+      </p:graphicFrame>
+      <p:sp>
+        <p:nvSpPr>
+          <p:cNvPr id="2" name="Rectangle 1"/>
+          <p:cNvSpPr/>
+          <p:nvPr/>
+        </p:nvSpPr>
+        <p:spPr>
+          <a:xfrm>
+            <a:off x="2515733" y="4229287"/>
+            <a:ext cx="503664" cy="246221"/>
+          </a:xfrm>
+          <a:prstGeom prst="rect">
+            <a:avLst/>
+          </a:prstGeom>
+        </p:spPr>
+        <p:txBody>
+          <a:bodyPr wrap="none">
+            <a:spAutoFit/>
+          </a:bodyPr>
+          <a:lstStyle/>
+          <a:p>
+            <a:pPr algn="ctr">
+              <a:defRPr sz="1400" b="0" i="0" u="none" strike="noStrike" kern="1200" spc="0" baseline="0">
+                <a:solidFill>
+                  <a:srgbClr val="000000">
+                    <a:lumMod val="65000"/>
+                    <a:lumOff val="35000"/>
+                  </a:srgbClr>
+                </a:solidFill>
+                <a:latin typeface="+mn-lt"/>
+                <a:ea typeface="+mn-ea"/>
+                <a:cs typeface="+mn-cs"/>
+              </a:defRPr>
+            </a:pPr>
+            <a:r>
+              <a:rPr lang="en-US" sz="1000" kern="1200" dirty="0" smtClean="0">
+                <a:solidFill>
+                  <a:srgbClr val="000000">
+                    <a:lumMod val="65000"/>
+                    <a:lumOff val="35000"/>
+                  </a:srgbClr>
+                </a:solidFill>
+                <a:latin typeface="+mn-lt"/>
+              </a:rPr>
+              <a:t>Sales</a:t>
+            </a:r>
+            <a:endParaRPr lang="en-US" sz="1000" kern="1200" dirty="0">
+              <a:solidFill>
+                <a:srgbClr val="000000">
+                  <a:lumMod val="65000"/>
+                  <a:lumOff val="35000"/>
+                </a:srgbClr>
+              </a:solidFill>
+              <a:latin typeface="+mn-lt"/>
+            </a:endParaRPr>
           </a:p>
         </p:txBody>
       </p:sp>
@@ -11168,7 +11179,7 @@
           <p:nvPr>
             <p:extLst>
               <p:ext uri="{D42A27DB-BD31-4B8C-83A1-F6EECF244321}">
-                <p14:modId xmlns:p14="http://schemas.microsoft.com/office/powerpoint/2010/main" val="2612224011"/>
+                <p14:modId xmlns:p14="http://schemas.microsoft.com/office/powerpoint/2010/main" val="863400175"/>
               </p:ext>
             </p:extLst>
           </p:nvPr>
@@ -11240,6 +11251,34 @@
               <a:rPr lang="en-US" dirty="0"/>
             </a:br>
             <a:endParaRPr lang="en-US" dirty="0"/>
+          </a:p>
+        </p:txBody>
+      </p:sp>
+      <p:sp>
+        <p:nvSpPr>
+          <p:cNvPr id="2" name="Rectangle 1"/>
+          <p:cNvSpPr/>
+          <p:nvPr/>
+        </p:nvSpPr>
+        <p:spPr>
+          <a:xfrm rot="16200000">
+            <a:off x="35514" y="2606384"/>
+            <a:ext cx="982961" cy="215444"/>
+          </a:xfrm>
+          <a:prstGeom prst="rect">
+            <a:avLst/>
+          </a:prstGeom>
+        </p:spPr>
+        <p:txBody>
+          <a:bodyPr wrap="none">
+            <a:spAutoFit/>
+          </a:bodyPr>
+          <a:lstStyle/>
+          <a:p>
+            <a:r>
+              <a:rPr lang="en-US" sz="800" dirty="0"/>
+              <a:t>numbers of spent</a:t>
+            </a:r>
           </a:p>
         </p:txBody>
       </p:sp>

</xml_diff>